<commit_message>
added in ARIMA for sanity check
</commit_message>
<xml_diff>
--- a/presentation/ProblemMotivationSolution-matt_pw.pptx
+++ b/presentation/ProblemMotivationSolution-matt_pw.pptx
@@ -251,7 +251,7 @@
           <a:p>
             <a:fld id="{82E1362B-872B-324B-9637-DF76BB0A3737}" type="datetimeFigureOut">
               <a:rPr lang="en-US" smtClean="0"/>
-              <a:t>10/4/2017</a:t>
+              <a:t>10/4/17</a:t>
             </a:fld>
             <a:endParaRPr lang="en-US"/>
           </a:p>
@@ -419,7 +419,7 @@
           <a:p>
             <a:fld id="{82E1362B-872B-324B-9637-DF76BB0A3737}" type="datetimeFigureOut">
               <a:rPr lang="en-US" smtClean="0"/>
-              <a:t>10/4/2017</a:t>
+              <a:t>10/4/17</a:t>
             </a:fld>
             <a:endParaRPr lang="en-US"/>
           </a:p>
@@ -597,7 +597,7 @@
           <a:p>
             <a:fld id="{82E1362B-872B-324B-9637-DF76BB0A3737}" type="datetimeFigureOut">
               <a:rPr lang="en-US" smtClean="0"/>
-              <a:t>10/4/2017</a:t>
+              <a:t>10/4/17</a:t>
             </a:fld>
             <a:endParaRPr lang="en-US"/>
           </a:p>
@@ -765,7 +765,7 @@
           <a:p>
             <a:fld id="{82E1362B-872B-324B-9637-DF76BB0A3737}" type="datetimeFigureOut">
               <a:rPr lang="en-US" smtClean="0"/>
-              <a:t>10/4/2017</a:t>
+              <a:t>10/4/17</a:t>
             </a:fld>
             <a:endParaRPr lang="en-US"/>
           </a:p>
@@ -1010,7 +1010,7 @@
           <a:p>
             <a:fld id="{82E1362B-872B-324B-9637-DF76BB0A3737}" type="datetimeFigureOut">
               <a:rPr lang="en-US" smtClean="0"/>
-              <a:t>10/4/2017</a:t>
+              <a:t>10/4/17</a:t>
             </a:fld>
             <a:endParaRPr lang="en-US"/>
           </a:p>
@@ -1239,7 +1239,7 @@
           <a:p>
             <a:fld id="{82E1362B-872B-324B-9637-DF76BB0A3737}" type="datetimeFigureOut">
               <a:rPr lang="en-US" smtClean="0"/>
-              <a:t>10/4/2017</a:t>
+              <a:t>10/4/17</a:t>
             </a:fld>
             <a:endParaRPr lang="en-US"/>
           </a:p>
@@ -1603,7 +1603,7 @@
           <a:p>
             <a:fld id="{82E1362B-872B-324B-9637-DF76BB0A3737}" type="datetimeFigureOut">
               <a:rPr lang="en-US" smtClean="0"/>
-              <a:t>10/4/2017</a:t>
+              <a:t>10/4/17</a:t>
             </a:fld>
             <a:endParaRPr lang="en-US"/>
           </a:p>
@@ -1720,7 +1720,7 @@
           <a:p>
             <a:fld id="{82E1362B-872B-324B-9637-DF76BB0A3737}" type="datetimeFigureOut">
               <a:rPr lang="en-US" smtClean="0"/>
-              <a:t>10/4/2017</a:t>
+              <a:t>10/4/17</a:t>
             </a:fld>
             <a:endParaRPr lang="en-US"/>
           </a:p>
@@ -1815,7 +1815,7 @@
           <a:p>
             <a:fld id="{82E1362B-872B-324B-9637-DF76BB0A3737}" type="datetimeFigureOut">
               <a:rPr lang="en-US" smtClean="0"/>
-              <a:t>10/4/2017</a:t>
+              <a:t>10/4/17</a:t>
             </a:fld>
             <a:endParaRPr lang="en-US"/>
           </a:p>
@@ -2090,7 +2090,7 @@
           <a:p>
             <a:fld id="{82E1362B-872B-324B-9637-DF76BB0A3737}" type="datetimeFigureOut">
               <a:rPr lang="en-US" smtClean="0"/>
-              <a:t>10/4/2017</a:t>
+              <a:t>10/4/17</a:t>
             </a:fld>
             <a:endParaRPr lang="en-US"/>
           </a:p>
@@ -2342,7 +2342,7 @@
           <a:p>
             <a:fld id="{82E1362B-872B-324B-9637-DF76BB0A3737}" type="datetimeFigureOut">
               <a:rPr lang="en-US" smtClean="0"/>
-              <a:t>10/4/2017</a:t>
+              <a:t>10/4/17</a:t>
             </a:fld>
             <a:endParaRPr lang="en-US"/>
           </a:p>
@@ -2553,7 +2553,7 @@
           <a:p>
             <a:fld id="{82E1362B-872B-324B-9637-DF76BB0A3737}" type="datetimeFigureOut">
               <a:rPr lang="en-US" smtClean="0"/>
-              <a:t>10/4/2017</a:t>
+              <a:t>10/4/17</a:t>
             </a:fld>
             <a:endParaRPr lang="en-US"/>
           </a:p>
@@ -3285,7 +3285,7 @@
         <p:spPr/>
         <p:txBody>
           <a:bodyPr>
-            <a:normAutofit lnSpcReduction="10000"/>
+            <a:normAutofit fontScale="92500" lnSpcReduction="20000"/>
           </a:bodyPr>
           <a:lstStyle/>
           <a:p>
@@ -3321,8 +3321,26 @@
           <a:p>
             <a:r>
               <a:rPr lang="en-US" dirty="0"/>
-              <a:t>Select model with lowest errors.</a:t>
-            </a:r>
+              <a:t>Select model with lowest errors</a:t>
+            </a:r>
+            <a:r>
+              <a:rPr lang="en-US" dirty="0" smtClean="0"/>
+              <a:t>.</a:t>
+            </a:r>
+          </a:p>
+          <a:p>
+            <a:r>
+              <a:rPr lang="en-US" dirty="0" smtClean="0"/>
+              <a:t>Compare results against traditional ARIMA model for </a:t>
+            </a:r>
+            <a:r>
+              <a:rPr lang="en-US" smtClean="0"/>
+              <a:t>price change and forecasting.</a:t>
+            </a:r>
+            <a:endParaRPr lang="en-US" dirty="0" smtClean="0"/>
+          </a:p>
+          <a:p>
+            <a:endParaRPr lang="en-US" dirty="0"/>
           </a:p>
         </p:txBody>
       </p:sp>
@@ -3459,7 +3477,7 @@
           <p:cNvPr id="2" name="Title 1">
             <a:extLst>
               <a:ext uri="{FF2B5EF4-FFF2-40B4-BE49-F238E27FC236}">
-                <a16:creationId xmlns:a16="http://schemas.microsoft.com/office/drawing/2014/main" id="{900D1070-2892-410A-AA79-E9C69ED2267E}"/>
+                <a16:creationId xmlns:a16="http://schemas.microsoft.com/office/drawing/2014/main" xmlns="" id="{900D1070-2892-410A-AA79-E9C69ED2267E}"/>
               </a:ext>
             </a:extLst>
           </p:cNvPr>
@@ -3487,7 +3505,7 @@
           <p:cNvPr id="3" name="Content Placeholder 2">
             <a:extLst>
               <a:ext uri="{FF2B5EF4-FFF2-40B4-BE49-F238E27FC236}">
-                <a16:creationId xmlns:a16="http://schemas.microsoft.com/office/drawing/2014/main" id="{224FB7C4-276A-42D7-A016-ECA735587295}"/>
+                <a16:creationId xmlns:a16="http://schemas.microsoft.com/office/drawing/2014/main" xmlns="" id="{224FB7C4-276A-42D7-A016-ECA735587295}"/>
               </a:ext>
             </a:extLst>
           </p:cNvPr>
@@ -3589,7 +3607,7 @@
           <p:cNvPr id="2" name="Title 1">
             <a:extLst>
               <a:ext uri="{FF2B5EF4-FFF2-40B4-BE49-F238E27FC236}">
-                <a16:creationId xmlns:a16="http://schemas.microsoft.com/office/drawing/2014/main" id="{01CBDF7D-23CE-4507-A8C1-3D974AC1866C}"/>
+                <a16:creationId xmlns:a16="http://schemas.microsoft.com/office/drawing/2014/main" xmlns="" id="{01CBDF7D-23CE-4507-A8C1-3D974AC1866C}"/>
               </a:ext>
             </a:extLst>
           </p:cNvPr>
@@ -3617,7 +3635,7 @@
           <p:cNvPr id="3" name="Content Placeholder 2">
             <a:extLst>
               <a:ext uri="{FF2B5EF4-FFF2-40B4-BE49-F238E27FC236}">
-                <a16:creationId xmlns:a16="http://schemas.microsoft.com/office/drawing/2014/main" id="{F254146C-F688-416D-8020-C79FC9B45B15}"/>
+                <a16:creationId xmlns:a16="http://schemas.microsoft.com/office/drawing/2014/main" xmlns="" id="{F254146C-F688-416D-8020-C79FC9B45B15}"/>
               </a:ext>
             </a:extLst>
           </p:cNvPr>

</xml_diff>